<commit_message>
More figures in the powerpoint. Nearly finished the single-particle plasmon theory stuff.
</commit_message>
<xml_diff>
--- a/Transfer Thesis Figures.pptx
+++ b/Transfer Thesis Figures.pptx
@@ -14,7 +14,7 @@
     <p:sldId id="262" r:id="rId5"/>
     <p:sldId id="260" r:id="rId6"/>
     <p:sldId id="261" r:id="rId7"/>
-    <p:sldId id="259" r:id="rId8"/>
+    <p:sldId id="263" r:id="rId8"/>
   </p:sldIdLst>
   <p:sldSz cx="12192000" cy="6858000"/>
   <p:notesSz cx="6858000" cy="9144000"/>
@@ -214,7 +214,7 @@
           <a:p>
             <a:fld id="{AF80148B-F47F-458D-AD6E-D10B702E967E}" type="datetimeFigureOut">
               <a:rPr lang="en-GB" smtClean="0"/>
-              <a:t>11/05/2018</a:t>
+              <a:t>12/05/2018</a:t>
             </a:fld>
             <a:endParaRPr lang="en-GB"/>
           </a:p>
@@ -697,7 +697,7 @@
           <a:p>
             <a:fld id="{984CDA32-28DD-447A-B6AF-64F315477357}" type="datetimeFigureOut">
               <a:rPr lang="en-GB" smtClean="0"/>
-              <a:t>10/05/2018</a:t>
+              <a:t>12/05/2018</a:t>
             </a:fld>
             <a:endParaRPr lang="en-GB"/>
           </a:p>
@@ -867,7 +867,7 @@
           <a:p>
             <a:fld id="{984CDA32-28DD-447A-B6AF-64F315477357}" type="datetimeFigureOut">
               <a:rPr lang="en-GB" smtClean="0"/>
-              <a:t>10/05/2018</a:t>
+              <a:t>12/05/2018</a:t>
             </a:fld>
             <a:endParaRPr lang="en-GB"/>
           </a:p>
@@ -1047,7 +1047,7 @@
           <a:p>
             <a:fld id="{984CDA32-28DD-447A-B6AF-64F315477357}" type="datetimeFigureOut">
               <a:rPr lang="en-GB" smtClean="0"/>
-              <a:t>10/05/2018</a:t>
+              <a:t>12/05/2018</a:t>
             </a:fld>
             <a:endParaRPr lang="en-GB"/>
           </a:p>
@@ -1217,7 +1217,7 @@
           <a:p>
             <a:fld id="{984CDA32-28DD-447A-B6AF-64F315477357}" type="datetimeFigureOut">
               <a:rPr lang="en-GB" smtClean="0"/>
-              <a:t>10/05/2018</a:t>
+              <a:t>12/05/2018</a:t>
             </a:fld>
             <a:endParaRPr lang="en-GB"/>
           </a:p>
@@ -1463,7 +1463,7 @@
           <a:p>
             <a:fld id="{984CDA32-28DD-447A-B6AF-64F315477357}" type="datetimeFigureOut">
               <a:rPr lang="en-GB" smtClean="0"/>
-              <a:t>10/05/2018</a:t>
+              <a:t>12/05/2018</a:t>
             </a:fld>
             <a:endParaRPr lang="en-GB"/>
           </a:p>
@@ -1695,7 +1695,7 @@
           <a:p>
             <a:fld id="{984CDA32-28DD-447A-B6AF-64F315477357}" type="datetimeFigureOut">
               <a:rPr lang="en-GB" smtClean="0"/>
-              <a:t>10/05/2018</a:t>
+              <a:t>12/05/2018</a:t>
             </a:fld>
             <a:endParaRPr lang="en-GB"/>
           </a:p>
@@ -2062,7 +2062,7 @@
           <a:p>
             <a:fld id="{984CDA32-28DD-447A-B6AF-64F315477357}" type="datetimeFigureOut">
               <a:rPr lang="en-GB" smtClean="0"/>
-              <a:t>10/05/2018</a:t>
+              <a:t>12/05/2018</a:t>
             </a:fld>
             <a:endParaRPr lang="en-GB"/>
           </a:p>
@@ -2180,7 +2180,7 @@
           <a:p>
             <a:fld id="{984CDA32-28DD-447A-B6AF-64F315477357}" type="datetimeFigureOut">
               <a:rPr lang="en-GB" smtClean="0"/>
-              <a:t>10/05/2018</a:t>
+              <a:t>12/05/2018</a:t>
             </a:fld>
             <a:endParaRPr lang="en-GB"/>
           </a:p>
@@ -2275,7 +2275,7 @@
           <a:p>
             <a:fld id="{984CDA32-28DD-447A-B6AF-64F315477357}" type="datetimeFigureOut">
               <a:rPr lang="en-GB" smtClean="0"/>
-              <a:t>10/05/2018</a:t>
+              <a:t>12/05/2018</a:t>
             </a:fld>
             <a:endParaRPr lang="en-GB"/>
           </a:p>
@@ -2552,7 +2552,7 @@
           <a:p>
             <a:fld id="{984CDA32-28DD-447A-B6AF-64F315477357}" type="datetimeFigureOut">
               <a:rPr lang="en-GB" smtClean="0"/>
-              <a:t>10/05/2018</a:t>
+              <a:t>12/05/2018</a:t>
             </a:fld>
             <a:endParaRPr lang="en-GB"/>
           </a:p>
@@ -2805,7 +2805,7 @@
           <a:p>
             <a:fld id="{984CDA32-28DD-447A-B6AF-64F315477357}" type="datetimeFigureOut">
               <a:rPr lang="en-GB" smtClean="0"/>
-              <a:t>10/05/2018</a:t>
+              <a:t>12/05/2018</a:t>
             </a:fld>
             <a:endParaRPr lang="en-GB"/>
           </a:p>
@@ -3018,7 +3018,7 @@
           <a:p>
             <a:fld id="{984CDA32-28DD-447A-B6AF-64F315477357}" type="datetimeFigureOut">
               <a:rPr lang="en-GB" smtClean="0"/>
-              <a:t>10/05/2018</a:t>
+              <a:t>12/05/2018</a:t>
             </a:fld>
             <a:endParaRPr lang="en-GB"/>
           </a:p>
@@ -10390,6 +10390,102 @@
               <a:t>Microscope</a:t>
             </a:r>
             <a:endParaRPr lang="en-GB" sz="1400" dirty="0"/>
+          </a:p>
+        </p:txBody>
+      </p:sp>
+      <p:sp>
+        <p:nvSpPr>
+          <p:cNvPr id="7" name="TextBox 6"/>
+          <p:cNvSpPr txBox="1"/>
+          <p:nvPr/>
+        </p:nvSpPr>
+        <p:spPr>
+          <a:xfrm>
+            <a:off x="8682182" y="1682576"/>
+            <a:ext cx="2100190" cy="923330"/>
+          </a:xfrm>
+          <a:prstGeom prst="rect">
+            <a:avLst/>
+          </a:prstGeom>
+          <a:noFill/>
+        </p:spPr>
+        <p:txBody>
+          <a:bodyPr wrap="none" rtlCol="0">
+            <a:spAutoFit/>
+          </a:bodyPr>
+          <a:lstStyle/>
+          <a:p>
+            <a:r>
+              <a:rPr lang="en-GB" dirty="0" smtClean="0"/>
+              <a:t>785 </a:t>
+            </a:r>
+            <a:r>
+              <a:rPr lang="en-GB" dirty="0" err="1" smtClean="0"/>
+              <a:t>RazorEdge</a:t>
+            </a:r>
+            <a:r>
+              <a:rPr lang="en-GB" dirty="0" smtClean="0"/>
+              <a:t> Filter</a:t>
+            </a:r>
+          </a:p>
+          <a:p>
+            <a:r>
+              <a:rPr lang="en-GB" dirty="0" smtClean="0"/>
+              <a:t># LPO2-785RU-25</a:t>
+            </a:r>
+            <a:endParaRPr lang="en-GB" dirty="0"/>
+          </a:p>
+          <a:p>
+            <a:endParaRPr lang="en-GB" dirty="0"/>
+          </a:p>
+        </p:txBody>
+      </p:sp>
+      <p:sp>
+        <p:nvSpPr>
+          <p:cNvPr id="10" name="TextBox 9"/>
+          <p:cNvSpPr txBox="1"/>
+          <p:nvPr/>
+        </p:nvSpPr>
+        <p:spPr>
+          <a:xfrm>
+            <a:off x="8488218" y="2456873"/>
+            <a:ext cx="3632085" cy="646331"/>
+          </a:xfrm>
+          <a:prstGeom prst="rect">
+            <a:avLst/>
+          </a:prstGeom>
+          <a:noFill/>
+        </p:spPr>
+        <p:txBody>
+          <a:bodyPr wrap="none" rtlCol="0">
+            <a:spAutoFit/>
+          </a:bodyPr>
+          <a:lstStyle/>
+          <a:p>
+            <a:r>
+              <a:rPr lang="en-GB" dirty="0" smtClean="0"/>
+              <a:t>785 </a:t>
+            </a:r>
+            <a:r>
+              <a:rPr lang="en-GB" dirty="0" err="1" smtClean="0"/>
+              <a:t>RazorEdge</a:t>
+            </a:r>
+            <a:r>
+              <a:rPr lang="en-GB" dirty="0" smtClean="0"/>
+              <a:t> Dichroic </a:t>
+            </a:r>
+            <a:r>
+              <a:rPr lang="en-GB" dirty="0" err="1" smtClean="0"/>
+              <a:t>Beamsplitter</a:t>
+            </a:r>
+            <a:endParaRPr lang="en-GB" dirty="0" smtClean="0"/>
+          </a:p>
+          <a:p>
+            <a:r>
+              <a:rPr lang="en-GB" dirty="0" smtClean="0"/>
+              <a:t># LPDO2-785RU-25</a:t>
+            </a:r>
+            <a:endParaRPr lang="en-GB" dirty="0"/>
           </a:p>
         </p:txBody>
       </p:sp>
@@ -22052,8 +22148,8 @@
           </a:fontRef>
         </p:style>
       </p:cxnSp>
-      <mc:AlternateContent xmlns:mc="http://schemas.openxmlformats.org/markup-compatibility/2006">
-        <mc:Choice xmlns:a14="http://schemas.microsoft.com/office/drawing/2010/main" Requires="a14">
+      <mc:AlternateContent xmlns:mc="http://schemas.openxmlformats.org/markup-compatibility/2006" xmlns:a14="http://schemas.microsoft.com/office/drawing/2010/main">
+        <mc:Choice Requires="a14">
           <p:sp>
             <p:nvSpPr>
               <p:cNvPr id="108" name="TextBox 107"/>
@@ -22076,6 +22172,7 @@
               </a:bodyPr>
               <a:lstStyle/>
               <a:p>
+                <a:pPr/>
                 <a14:m>
                   <m:oMathPara xmlns:m="http://schemas.openxmlformats.org/officeDocument/2006/math">
                     <m:oMathParaPr>
@@ -22130,7 +22227,7 @@
             </p:txBody>
           </p:sp>
         </mc:Choice>
-        <mc:Fallback>
+        <mc:Fallback xmlns="">
           <p:sp>
             <p:nvSpPr>
               <p:cNvPr id="108" name="TextBox 107"/>
@@ -22169,8 +22266,8 @@
           </p:sp>
         </mc:Fallback>
       </mc:AlternateContent>
-      <mc:AlternateContent xmlns:mc="http://schemas.openxmlformats.org/markup-compatibility/2006">
-        <mc:Choice xmlns:a14="http://schemas.microsoft.com/office/drawing/2010/main" Requires="a14">
+      <mc:AlternateContent xmlns:mc="http://schemas.openxmlformats.org/markup-compatibility/2006" xmlns:a14="http://schemas.microsoft.com/office/drawing/2010/main">
+        <mc:Choice Requires="a14">
           <p:sp>
             <p:nvSpPr>
               <p:cNvPr id="256" name="TextBox 255"/>
@@ -22193,6 +22290,7 @@
               </a:bodyPr>
               <a:lstStyle/>
               <a:p>
+                <a:pPr/>
                 <a14:m>
                   <m:oMathPara xmlns:m="http://schemas.openxmlformats.org/officeDocument/2006/math">
                     <m:oMathParaPr>
@@ -22254,7 +22352,7 @@
             </p:txBody>
           </p:sp>
         </mc:Choice>
-        <mc:Fallback>
+        <mc:Fallback xmlns="">
           <p:sp>
             <p:nvSpPr>
               <p:cNvPr id="256" name="TextBox 255"/>
@@ -22293,8 +22391,8 @@
           </p:sp>
         </mc:Fallback>
       </mc:AlternateContent>
-      <mc:AlternateContent xmlns:mc="http://schemas.openxmlformats.org/markup-compatibility/2006">
-        <mc:Choice xmlns:a14="http://schemas.microsoft.com/office/drawing/2010/main" Requires="a14">
+      <mc:AlternateContent xmlns:mc="http://schemas.openxmlformats.org/markup-compatibility/2006" xmlns:a14="http://schemas.microsoft.com/office/drawing/2010/main">
+        <mc:Choice Requires="a14">
           <p:sp>
             <p:nvSpPr>
               <p:cNvPr id="257" name="TextBox 256"/>
@@ -22317,6 +22415,7 @@
               </a:bodyPr>
               <a:lstStyle/>
               <a:p>
+                <a:pPr/>
                 <a14:m>
                   <m:oMathPara xmlns:m="http://schemas.openxmlformats.org/officeDocument/2006/math">
                     <m:oMathParaPr>
@@ -22378,7 +22477,7 @@
             </p:txBody>
           </p:sp>
         </mc:Choice>
-        <mc:Fallback>
+        <mc:Fallback xmlns="">
           <p:sp>
             <p:nvSpPr>
               <p:cNvPr id="257" name="TextBox 256"/>
@@ -22417,8 +22516,8 @@
           </p:sp>
         </mc:Fallback>
       </mc:AlternateContent>
-      <mc:AlternateContent xmlns:mc="http://schemas.openxmlformats.org/markup-compatibility/2006">
-        <mc:Choice xmlns:a14="http://schemas.microsoft.com/office/drawing/2010/main" Requires="a14">
+      <mc:AlternateContent xmlns:mc="http://schemas.openxmlformats.org/markup-compatibility/2006" xmlns:a14="http://schemas.microsoft.com/office/drawing/2010/main">
+        <mc:Choice Requires="a14">
           <p:sp>
             <p:nvSpPr>
               <p:cNvPr id="258" name="TextBox 257"/>
@@ -22441,6 +22540,7 @@
               </a:bodyPr>
               <a:lstStyle/>
               <a:p>
+                <a:pPr/>
                 <a14:m>
                   <m:oMathPara xmlns:m="http://schemas.openxmlformats.org/officeDocument/2006/math">
                     <m:oMathParaPr>
@@ -22495,7 +22595,7 @@
             </p:txBody>
           </p:sp>
         </mc:Choice>
-        <mc:Fallback>
+        <mc:Fallback xmlns="">
           <p:sp>
             <p:nvSpPr>
               <p:cNvPr id="258" name="TextBox 257"/>
@@ -22534,8 +22634,8 @@
           </p:sp>
         </mc:Fallback>
       </mc:AlternateContent>
-      <mc:AlternateContent xmlns:mc="http://schemas.openxmlformats.org/markup-compatibility/2006">
-        <mc:Choice xmlns:a14="http://schemas.microsoft.com/office/drawing/2010/main" Requires="a14">
+      <mc:AlternateContent xmlns:mc="http://schemas.openxmlformats.org/markup-compatibility/2006" xmlns:a14="http://schemas.microsoft.com/office/drawing/2010/main">
+        <mc:Choice Requires="a14">
           <p:sp>
             <p:nvSpPr>
               <p:cNvPr id="259" name="TextBox 258"/>
@@ -22558,6 +22658,7 @@
               </a:bodyPr>
               <a:lstStyle/>
               <a:p>
+                <a:pPr/>
                 <a14:m>
                   <m:oMathPara xmlns:m="http://schemas.openxmlformats.org/officeDocument/2006/math">
                     <m:oMathParaPr>
@@ -22619,7 +22720,7 @@
             </p:txBody>
           </p:sp>
         </mc:Choice>
-        <mc:Fallback>
+        <mc:Fallback xmlns="">
           <p:sp>
             <p:nvSpPr>
               <p:cNvPr id="259" name="TextBox 258"/>
@@ -22658,8 +22759,8 @@
           </p:sp>
         </mc:Fallback>
       </mc:AlternateContent>
-      <mc:AlternateContent xmlns:mc="http://schemas.openxmlformats.org/markup-compatibility/2006">
-        <mc:Choice xmlns:a14="http://schemas.microsoft.com/office/drawing/2010/main" Requires="a14">
+      <mc:AlternateContent xmlns:mc="http://schemas.openxmlformats.org/markup-compatibility/2006" xmlns:a14="http://schemas.microsoft.com/office/drawing/2010/main">
+        <mc:Choice Requires="a14">
           <p:sp>
             <p:nvSpPr>
               <p:cNvPr id="260" name="TextBox 259"/>
@@ -22682,6 +22783,7 @@
               </a:bodyPr>
               <a:lstStyle/>
               <a:p>
+                <a:pPr/>
                 <a14:m>
                   <m:oMathPara xmlns:m="http://schemas.openxmlformats.org/officeDocument/2006/math">
                     <m:oMathParaPr>
@@ -22736,7 +22838,7 @@
             </p:txBody>
           </p:sp>
         </mc:Choice>
-        <mc:Fallback>
+        <mc:Fallback xmlns="">
           <p:sp>
             <p:nvSpPr>
               <p:cNvPr id="260" name="TextBox 259"/>
@@ -25174,10 +25276,2070 @@
           <a:chExt cx="0" cy="0"/>
         </a:xfrm>
       </p:grpSpPr>
+      <p:sp>
+        <p:nvSpPr>
+          <p:cNvPr id="222" name="TextBox 221"/>
+          <p:cNvSpPr txBox="1"/>
+          <p:nvPr/>
+        </p:nvSpPr>
+        <p:spPr>
+          <a:xfrm>
+            <a:off x="3126982" y="-79142"/>
+            <a:ext cx="5938036" cy="1107996"/>
+          </a:xfrm>
+          <a:prstGeom prst="rect">
+            <a:avLst/>
+          </a:prstGeom>
+          <a:noFill/>
+        </p:spPr>
+        <p:txBody>
+          <a:bodyPr wrap="none" rtlCol="0">
+            <a:spAutoFit/>
+          </a:bodyPr>
+          <a:lstStyle/>
+          <a:p>
+            <a:r>
+              <a:rPr lang="en-GB" sz="6600" dirty="0" smtClean="0"/>
+              <a:t>NP Hybridisation</a:t>
+            </a:r>
+            <a:endParaRPr lang="en-GB" sz="6600" dirty="0"/>
+          </a:p>
+        </p:txBody>
+      </p:sp>
+      <p:sp>
+        <p:nvSpPr>
+          <p:cNvPr id="162" name="Oval 161"/>
+          <p:cNvSpPr/>
+          <p:nvPr/>
+        </p:nvSpPr>
+        <p:spPr>
+          <a:xfrm rot="9900000">
+            <a:off x="3510301" y="1971889"/>
+            <a:ext cx="1422400" cy="1422400"/>
+          </a:xfrm>
+          <a:prstGeom prst="ellipse">
+            <a:avLst/>
+          </a:prstGeom>
+          <a:solidFill>
+            <a:schemeClr val="accent4">
+              <a:lumMod val="75000"/>
+            </a:schemeClr>
+          </a:solidFill>
+          <a:ln>
+            <a:noFill/>
+          </a:ln>
+          <a:scene3d>
+            <a:camera prst="orthographicFront"/>
+            <a:lightRig rig="harsh" dir="t"/>
+          </a:scene3d>
+          <a:sp3d prstMaterial="metal">
+            <a:bevelT w="698500" h="698500"/>
+          </a:sp3d>
+        </p:spPr>
+        <p:style>
+          <a:lnRef idx="2">
+            <a:schemeClr val="accent1">
+              <a:shade val="50000"/>
+            </a:schemeClr>
+          </a:lnRef>
+          <a:fillRef idx="1">
+            <a:schemeClr val="accent1"/>
+          </a:fillRef>
+          <a:effectRef idx="0">
+            <a:schemeClr val="accent1"/>
+          </a:effectRef>
+          <a:fontRef idx="minor">
+            <a:schemeClr val="lt1"/>
+          </a:fontRef>
+        </p:style>
+        <p:txBody>
+          <a:bodyPr rtlCol="0" anchor="ctr"/>
+          <a:lstStyle/>
+          <a:p>
+            <a:pPr algn="ctr"/>
+            <a:endParaRPr lang="en-GB"/>
+          </a:p>
+        </p:txBody>
+      </p:sp>
+      <p:sp>
+        <p:nvSpPr>
+          <p:cNvPr id="72" name="Oval 71"/>
+          <p:cNvSpPr/>
+          <p:nvPr/>
+        </p:nvSpPr>
+        <p:spPr>
+          <a:xfrm rot="9900000">
+            <a:off x="6750462" y="1964269"/>
+            <a:ext cx="1422400" cy="1422400"/>
+          </a:xfrm>
+          <a:prstGeom prst="ellipse">
+            <a:avLst/>
+          </a:prstGeom>
+          <a:solidFill>
+            <a:schemeClr val="accent4">
+              <a:lumMod val="75000"/>
+            </a:schemeClr>
+          </a:solidFill>
+          <a:ln>
+            <a:noFill/>
+          </a:ln>
+          <a:scene3d>
+            <a:camera prst="orthographicFront"/>
+            <a:lightRig rig="harsh" dir="t"/>
+          </a:scene3d>
+          <a:sp3d prstMaterial="metal">
+            <a:bevelT w="698500" h="698500"/>
+          </a:sp3d>
+        </p:spPr>
+        <p:style>
+          <a:lnRef idx="2">
+            <a:schemeClr val="accent1">
+              <a:shade val="50000"/>
+            </a:schemeClr>
+          </a:lnRef>
+          <a:fillRef idx="1">
+            <a:schemeClr val="accent1"/>
+          </a:fillRef>
+          <a:effectRef idx="0">
+            <a:schemeClr val="accent1"/>
+          </a:effectRef>
+          <a:fontRef idx="minor">
+            <a:schemeClr val="lt1"/>
+          </a:fontRef>
+        </p:style>
+        <p:txBody>
+          <a:bodyPr rtlCol="0" anchor="ctr"/>
+          <a:lstStyle/>
+          <a:p>
+            <a:pPr algn="ctr"/>
+            <a:endParaRPr lang="en-GB"/>
+          </a:p>
+        </p:txBody>
+      </p:sp>
+      <p:cxnSp>
+        <p:nvCxnSpPr>
+          <p:cNvPr id="4" name="Straight Arrow Connector 3"/>
+          <p:cNvCxnSpPr/>
+          <p:nvPr/>
+        </p:nvCxnSpPr>
+        <p:spPr>
+          <a:xfrm flipH="1">
+            <a:off x="4221501" y="2683089"/>
+            <a:ext cx="3240162" cy="0"/>
+          </a:xfrm>
+          <a:prstGeom prst="straightConnector1">
+            <a:avLst/>
+          </a:prstGeom>
+          <a:ln w="44450">
+            <a:solidFill>
+              <a:schemeClr val="tx1"/>
+            </a:solidFill>
+            <a:headEnd type="triangle"/>
+            <a:tailEnd type="triangle"/>
+          </a:ln>
+        </p:spPr>
+        <p:style>
+          <a:lnRef idx="1">
+            <a:schemeClr val="accent1"/>
+          </a:lnRef>
+          <a:fillRef idx="0">
+            <a:schemeClr val="accent1"/>
+          </a:fillRef>
+          <a:effectRef idx="0">
+            <a:schemeClr val="accent1"/>
+          </a:effectRef>
+          <a:fontRef idx="minor">
+            <a:schemeClr val="tx1"/>
+          </a:fontRef>
+        </p:style>
+      </p:cxnSp>
+      <p:cxnSp>
+        <p:nvCxnSpPr>
+          <p:cNvPr id="75" name="Straight Arrow Connector 74"/>
+          <p:cNvCxnSpPr/>
+          <p:nvPr/>
+        </p:nvCxnSpPr>
+        <p:spPr>
+          <a:xfrm flipH="1" flipV="1">
+            <a:off x="4480050" y="2018030"/>
+            <a:ext cx="2888030" cy="657440"/>
+          </a:xfrm>
+          <a:prstGeom prst="straightConnector1">
+            <a:avLst/>
+          </a:prstGeom>
+          <a:ln w="44450">
+            <a:solidFill>
+              <a:schemeClr val="tx1"/>
+            </a:solidFill>
+            <a:tailEnd type="triangle"/>
+          </a:ln>
+        </p:spPr>
+        <p:style>
+          <a:lnRef idx="1">
+            <a:schemeClr val="accent1"/>
+          </a:lnRef>
+          <a:fillRef idx="0">
+            <a:schemeClr val="accent1"/>
+          </a:fillRef>
+          <a:effectRef idx="0">
+            <a:schemeClr val="accent1"/>
+          </a:effectRef>
+          <a:fontRef idx="minor">
+            <a:schemeClr val="tx1"/>
+          </a:fontRef>
+        </p:style>
+      </p:cxnSp>
+      <p:cxnSp>
+        <p:nvCxnSpPr>
+          <p:cNvPr id="77" name="Straight Arrow Connector 76"/>
+          <p:cNvCxnSpPr/>
+          <p:nvPr/>
+        </p:nvCxnSpPr>
+        <p:spPr>
+          <a:xfrm flipV="1">
+            <a:off x="4221501" y="2018030"/>
+            <a:ext cx="258549" cy="672680"/>
+          </a:xfrm>
+          <a:prstGeom prst="straightConnector1">
+            <a:avLst/>
+          </a:prstGeom>
+          <a:ln w="44450">
+            <a:solidFill>
+              <a:schemeClr val="tx1"/>
+            </a:solidFill>
+            <a:tailEnd type="triangle"/>
+          </a:ln>
+        </p:spPr>
+        <p:style>
+          <a:lnRef idx="1">
+            <a:schemeClr val="accent1"/>
+          </a:lnRef>
+          <a:fillRef idx="0">
+            <a:schemeClr val="accent1"/>
+          </a:fillRef>
+          <a:effectRef idx="0">
+            <a:schemeClr val="accent1"/>
+          </a:effectRef>
+          <a:fontRef idx="minor">
+            <a:schemeClr val="tx1"/>
+          </a:fontRef>
+        </p:style>
+      </p:cxnSp>
+      <p:sp>
+        <p:nvSpPr>
+          <p:cNvPr id="14" name="Arc 13"/>
+          <p:cNvSpPr/>
+          <p:nvPr/>
+        </p:nvSpPr>
+        <p:spPr>
+          <a:xfrm rot="900000">
+            <a:off x="4081664" y="2469625"/>
+            <a:ext cx="358140" cy="358140"/>
+          </a:xfrm>
+          <a:prstGeom prst="arc">
+            <a:avLst/>
+          </a:prstGeom>
+          <a:ln w="25400">
+            <a:solidFill>
+              <a:schemeClr val="tx1"/>
+            </a:solidFill>
+          </a:ln>
+        </p:spPr>
+        <p:style>
+          <a:lnRef idx="1">
+            <a:schemeClr val="accent1"/>
+          </a:lnRef>
+          <a:fillRef idx="0">
+            <a:schemeClr val="accent1"/>
+          </a:fillRef>
+          <a:effectRef idx="0">
+            <a:schemeClr val="accent1"/>
+          </a:effectRef>
+          <a:fontRef idx="minor">
+            <a:schemeClr val="tx1"/>
+          </a:fontRef>
+        </p:style>
+        <p:txBody>
+          <a:bodyPr rtlCol="0" anchor="ctr"/>
+          <a:lstStyle/>
+          <a:p>
+            <a:pPr algn="ctr"/>
+            <a:endParaRPr lang="en-GB"/>
+          </a:p>
+        </p:txBody>
+      </p:sp>
+      <p:sp>
+        <p:nvSpPr>
+          <p:cNvPr id="15" name="Arc 14"/>
+          <p:cNvSpPr/>
+          <p:nvPr/>
+        </p:nvSpPr>
+        <p:spPr>
+          <a:xfrm rot="14400000">
+            <a:off x="6661338" y="2515344"/>
+            <a:ext cx="200660" cy="200660"/>
+          </a:xfrm>
+          <a:prstGeom prst="arc">
+            <a:avLst/>
+          </a:prstGeom>
+          <a:ln w="25400">
+            <a:solidFill>
+              <a:schemeClr val="tx1"/>
+            </a:solidFill>
+          </a:ln>
+        </p:spPr>
+        <p:style>
+          <a:lnRef idx="1">
+            <a:schemeClr val="accent1"/>
+          </a:lnRef>
+          <a:fillRef idx="0">
+            <a:schemeClr val="accent1"/>
+          </a:fillRef>
+          <a:effectRef idx="0">
+            <a:schemeClr val="accent1"/>
+          </a:effectRef>
+          <a:fontRef idx="minor">
+            <a:schemeClr val="tx1"/>
+          </a:fontRef>
+        </p:style>
+        <p:txBody>
+          <a:bodyPr rtlCol="0" anchor="ctr"/>
+          <a:lstStyle/>
+          <a:p>
+            <a:pPr algn="ctr"/>
+            <a:endParaRPr lang="en-GB"/>
+          </a:p>
+        </p:txBody>
+      </p:sp>
+      <p:sp>
+        <p:nvSpPr>
+          <p:cNvPr id="16" name="TextBox 15"/>
+          <p:cNvSpPr txBox="1"/>
+          <p:nvPr/>
+        </p:nvSpPr>
+        <p:spPr>
+          <a:xfrm>
+            <a:off x="6505079" y="2648695"/>
+            <a:ext cx="308098" cy="307777"/>
+          </a:xfrm>
+          <a:prstGeom prst="rect">
+            <a:avLst/>
+          </a:prstGeom>
+          <a:noFill/>
+        </p:spPr>
+        <p:txBody>
+          <a:bodyPr wrap="none" rtlCol="0">
+            <a:spAutoFit/>
+          </a:bodyPr>
+          <a:lstStyle/>
+          <a:p>
+            <a:r>
+              <a:rPr lang="el-GR" sz="1400" dirty="0" smtClean="0"/>
+              <a:t>θ</a:t>
+            </a:r>
+            <a:r>
+              <a:rPr lang="en-GB" sz="1400" baseline="-25000" dirty="0" smtClean="0"/>
+              <a:t>i</a:t>
+            </a:r>
+            <a:endParaRPr lang="en-GB" sz="1400" baseline="-25000" dirty="0"/>
+          </a:p>
+        </p:txBody>
+      </p:sp>
+      <p:sp>
+        <p:nvSpPr>
+          <p:cNvPr id="98" name="TextBox 97"/>
+          <p:cNvSpPr txBox="1"/>
+          <p:nvPr/>
+        </p:nvSpPr>
+        <p:spPr>
+          <a:xfrm>
+            <a:off x="4367933" y="2377369"/>
+            <a:ext cx="308098" cy="307777"/>
+          </a:xfrm>
+          <a:prstGeom prst="rect">
+            <a:avLst/>
+          </a:prstGeom>
+          <a:noFill/>
+        </p:spPr>
+        <p:txBody>
+          <a:bodyPr wrap="none" rtlCol="0">
+            <a:spAutoFit/>
+          </a:bodyPr>
+          <a:lstStyle/>
+          <a:p>
+            <a:r>
+              <a:rPr lang="el-GR" sz="1400" dirty="0" smtClean="0"/>
+              <a:t>θ</a:t>
+            </a:r>
+            <a:r>
+              <a:rPr lang="en-GB" sz="1400" baseline="-25000" dirty="0" smtClean="0"/>
+              <a:t>j</a:t>
+            </a:r>
+            <a:endParaRPr lang="en-GB" sz="1400" baseline="-25000" dirty="0"/>
+          </a:p>
+        </p:txBody>
+      </p:sp>
+      <p:cxnSp>
+        <p:nvCxnSpPr>
+          <p:cNvPr id="28" name="Straight Connector 27"/>
+          <p:cNvCxnSpPr/>
+          <p:nvPr/>
+        </p:nvCxnSpPr>
+        <p:spPr>
+          <a:xfrm>
+            <a:off x="3833264" y="3573272"/>
+            <a:ext cx="646786" cy="0"/>
+          </a:xfrm>
+          <a:prstGeom prst="line">
+            <a:avLst/>
+          </a:prstGeom>
+          <a:ln w="31750">
+            <a:solidFill>
+              <a:schemeClr val="tx1"/>
+            </a:solidFill>
+          </a:ln>
+        </p:spPr>
+        <p:style>
+          <a:lnRef idx="1">
+            <a:schemeClr val="accent1"/>
+          </a:lnRef>
+          <a:fillRef idx="0">
+            <a:schemeClr val="accent1"/>
+          </a:fillRef>
+          <a:effectRef idx="0">
+            <a:schemeClr val="accent1"/>
+          </a:effectRef>
+          <a:fontRef idx="minor">
+            <a:schemeClr val="tx1"/>
+          </a:fontRef>
+        </p:style>
+      </p:cxnSp>
+      <p:cxnSp>
+        <p:nvCxnSpPr>
+          <p:cNvPr id="104" name="Straight Connector 103"/>
+          <p:cNvCxnSpPr/>
+          <p:nvPr/>
+        </p:nvCxnSpPr>
+        <p:spPr>
+          <a:xfrm>
+            <a:off x="3833264" y="3725672"/>
+            <a:ext cx="646786" cy="0"/>
+          </a:xfrm>
+          <a:prstGeom prst="line">
+            <a:avLst/>
+          </a:prstGeom>
+          <a:ln w="31750">
+            <a:solidFill>
+              <a:schemeClr val="tx1"/>
+            </a:solidFill>
+          </a:ln>
+        </p:spPr>
+        <p:style>
+          <a:lnRef idx="1">
+            <a:schemeClr val="accent1"/>
+          </a:lnRef>
+          <a:fillRef idx="0">
+            <a:schemeClr val="accent1"/>
+          </a:fillRef>
+          <a:effectRef idx="0">
+            <a:schemeClr val="accent1"/>
+          </a:effectRef>
+          <a:fontRef idx="minor">
+            <a:schemeClr val="tx1"/>
+          </a:fontRef>
+        </p:style>
+      </p:cxnSp>
+      <p:cxnSp>
+        <p:nvCxnSpPr>
+          <p:cNvPr id="115" name="Straight Connector 114"/>
+          <p:cNvCxnSpPr/>
+          <p:nvPr/>
+        </p:nvCxnSpPr>
+        <p:spPr>
+          <a:xfrm>
+            <a:off x="7138270" y="5133340"/>
+            <a:ext cx="646786" cy="0"/>
+          </a:xfrm>
+          <a:prstGeom prst="line">
+            <a:avLst/>
+          </a:prstGeom>
+          <a:ln w="31750">
+            <a:solidFill>
+              <a:schemeClr val="tx1"/>
+            </a:solidFill>
+          </a:ln>
+        </p:spPr>
+        <p:style>
+          <a:lnRef idx="1">
+            <a:schemeClr val="accent1"/>
+          </a:lnRef>
+          <a:fillRef idx="0">
+            <a:schemeClr val="accent1"/>
+          </a:fillRef>
+          <a:effectRef idx="0">
+            <a:schemeClr val="accent1"/>
+          </a:effectRef>
+          <a:fontRef idx="minor">
+            <a:schemeClr val="tx1"/>
+          </a:fontRef>
+        </p:style>
+      </p:cxnSp>
+      <p:cxnSp>
+        <p:nvCxnSpPr>
+          <p:cNvPr id="118" name="Straight Connector 117"/>
+          <p:cNvCxnSpPr/>
+          <p:nvPr/>
+        </p:nvCxnSpPr>
+        <p:spPr>
+          <a:xfrm>
+            <a:off x="5443624" y="4934712"/>
+            <a:ext cx="747165" cy="0"/>
+          </a:xfrm>
+          <a:prstGeom prst="line">
+            <a:avLst/>
+          </a:prstGeom>
+          <a:ln w="31750">
+            <a:solidFill>
+              <a:schemeClr val="accent2">
+                <a:lumMod val="50000"/>
+              </a:schemeClr>
+            </a:solidFill>
+          </a:ln>
+        </p:spPr>
+        <p:style>
+          <a:lnRef idx="1">
+            <a:schemeClr val="accent1"/>
+          </a:lnRef>
+          <a:fillRef idx="0">
+            <a:schemeClr val="accent1"/>
+          </a:fillRef>
+          <a:effectRef idx="0">
+            <a:schemeClr val="accent1"/>
+          </a:effectRef>
+          <a:fontRef idx="minor">
+            <a:schemeClr val="tx1"/>
+          </a:fontRef>
+        </p:style>
+      </p:cxnSp>
+      <p:cxnSp>
+        <p:nvCxnSpPr>
+          <p:cNvPr id="119" name="Straight Connector 118"/>
+          <p:cNvCxnSpPr/>
+          <p:nvPr/>
+        </p:nvCxnSpPr>
+        <p:spPr>
+          <a:xfrm>
+            <a:off x="5443624" y="5569712"/>
+            <a:ext cx="747165" cy="0"/>
+          </a:xfrm>
+          <a:prstGeom prst="line">
+            <a:avLst/>
+          </a:prstGeom>
+          <a:ln w="31750">
+            <a:solidFill>
+              <a:schemeClr val="accent2">
+                <a:lumMod val="50000"/>
+              </a:schemeClr>
+            </a:solidFill>
+          </a:ln>
+        </p:spPr>
+        <p:style>
+          <a:lnRef idx="1">
+            <a:schemeClr val="accent1"/>
+          </a:lnRef>
+          <a:fillRef idx="0">
+            <a:schemeClr val="accent1"/>
+          </a:fillRef>
+          <a:effectRef idx="0">
+            <a:schemeClr val="accent1"/>
+          </a:effectRef>
+          <a:fontRef idx="minor">
+            <a:schemeClr val="tx1"/>
+          </a:fontRef>
+        </p:style>
+      </p:cxnSp>
+      <p:cxnSp>
+        <p:nvCxnSpPr>
+          <p:cNvPr id="107" name="Straight Connector 106"/>
+          <p:cNvCxnSpPr/>
+          <p:nvPr/>
+        </p:nvCxnSpPr>
+        <p:spPr>
+          <a:xfrm>
+            <a:off x="3833264" y="4152392"/>
+            <a:ext cx="646786" cy="0"/>
+          </a:xfrm>
+          <a:prstGeom prst="line">
+            <a:avLst/>
+          </a:prstGeom>
+          <a:ln w="31750">
+            <a:solidFill>
+              <a:schemeClr val="tx1"/>
+            </a:solidFill>
+          </a:ln>
+        </p:spPr>
+        <p:style>
+          <a:lnRef idx="1">
+            <a:schemeClr val="accent1"/>
+          </a:lnRef>
+          <a:fillRef idx="0">
+            <a:schemeClr val="accent1"/>
+          </a:fillRef>
+          <a:effectRef idx="0">
+            <a:schemeClr val="accent1"/>
+          </a:effectRef>
+          <a:fontRef idx="minor">
+            <a:schemeClr val="tx1"/>
+          </a:fontRef>
+        </p:style>
+      </p:cxnSp>
+      <p:cxnSp>
+        <p:nvCxnSpPr>
+          <p:cNvPr id="116" name="Straight Connector 115"/>
+          <p:cNvCxnSpPr/>
+          <p:nvPr/>
+        </p:nvCxnSpPr>
+        <p:spPr>
+          <a:xfrm>
+            <a:off x="5443624" y="3913632"/>
+            <a:ext cx="747165" cy="0"/>
+          </a:xfrm>
+          <a:prstGeom prst="line">
+            <a:avLst/>
+          </a:prstGeom>
+          <a:ln w="31750">
+            <a:solidFill>
+              <a:schemeClr val="tx1"/>
+            </a:solidFill>
+          </a:ln>
+        </p:spPr>
+        <p:style>
+          <a:lnRef idx="1">
+            <a:schemeClr val="accent1"/>
+          </a:lnRef>
+          <a:fillRef idx="0">
+            <a:schemeClr val="accent1"/>
+          </a:fillRef>
+          <a:effectRef idx="0">
+            <a:schemeClr val="accent1"/>
+          </a:effectRef>
+          <a:fontRef idx="minor">
+            <a:schemeClr val="tx1"/>
+          </a:fontRef>
+        </p:style>
+      </p:cxnSp>
+      <p:cxnSp>
+        <p:nvCxnSpPr>
+          <p:cNvPr id="30" name="Straight Connector 29"/>
+          <p:cNvCxnSpPr/>
+          <p:nvPr/>
+        </p:nvCxnSpPr>
+        <p:spPr>
+          <a:xfrm flipV="1">
+            <a:off x="4480050" y="3913632"/>
+            <a:ext cx="963574" cy="238760"/>
+          </a:xfrm>
+          <a:prstGeom prst="line">
+            <a:avLst/>
+          </a:prstGeom>
+          <a:ln w="19050">
+            <a:solidFill>
+              <a:schemeClr val="tx1"/>
+            </a:solidFill>
+            <a:prstDash val="dash"/>
+          </a:ln>
+        </p:spPr>
+        <p:style>
+          <a:lnRef idx="1">
+            <a:schemeClr val="accent1"/>
+          </a:lnRef>
+          <a:fillRef idx="0">
+            <a:schemeClr val="accent1"/>
+          </a:fillRef>
+          <a:effectRef idx="0">
+            <a:schemeClr val="accent1"/>
+          </a:effectRef>
+          <a:fontRef idx="minor">
+            <a:schemeClr val="tx1"/>
+          </a:fontRef>
+        </p:style>
+      </p:cxnSp>
+      <p:cxnSp>
+        <p:nvCxnSpPr>
+          <p:cNvPr id="123" name="Straight Connector 122"/>
+          <p:cNvCxnSpPr/>
+          <p:nvPr/>
+        </p:nvCxnSpPr>
+        <p:spPr>
+          <a:xfrm>
+            <a:off x="5443624" y="4404393"/>
+            <a:ext cx="714667" cy="0"/>
+          </a:xfrm>
+          <a:prstGeom prst="line">
+            <a:avLst/>
+          </a:prstGeom>
+          <a:ln w="31750">
+            <a:solidFill>
+              <a:schemeClr val="tx1"/>
+            </a:solidFill>
+          </a:ln>
+          <a:scene3d>
+            <a:camera prst="orthographicFront">
+              <a:rot lat="0" lon="0" rev="10800000"/>
+            </a:camera>
+            <a:lightRig rig="threePt" dir="t"/>
+          </a:scene3d>
+        </p:spPr>
+        <p:style>
+          <a:lnRef idx="1">
+            <a:schemeClr val="accent1"/>
+          </a:lnRef>
+          <a:fillRef idx="0">
+            <a:schemeClr val="accent1"/>
+          </a:fillRef>
+          <a:effectRef idx="0">
+            <a:schemeClr val="accent1"/>
+          </a:effectRef>
+          <a:fontRef idx="minor">
+            <a:schemeClr val="tx1"/>
+          </a:fontRef>
+        </p:style>
+      </p:cxnSp>
+      <p:cxnSp>
+        <p:nvCxnSpPr>
+          <p:cNvPr id="125" name="Straight Connector 124"/>
+          <p:cNvCxnSpPr/>
+          <p:nvPr/>
+        </p:nvCxnSpPr>
+        <p:spPr>
+          <a:xfrm flipV="1">
+            <a:off x="6158291" y="4165633"/>
+            <a:ext cx="963574" cy="238760"/>
+          </a:xfrm>
+          <a:prstGeom prst="line">
+            <a:avLst/>
+          </a:prstGeom>
+          <a:ln w="19050">
+            <a:solidFill>
+              <a:schemeClr val="tx1"/>
+            </a:solidFill>
+            <a:prstDash val="dash"/>
+          </a:ln>
+          <a:scene3d>
+            <a:camera prst="orthographicFront">
+              <a:rot lat="0" lon="0" rev="10800000"/>
+            </a:camera>
+            <a:lightRig rig="threePt" dir="t"/>
+          </a:scene3d>
+        </p:spPr>
+        <p:style>
+          <a:lnRef idx="1">
+            <a:schemeClr val="accent1"/>
+          </a:lnRef>
+          <a:fillRef idx="0">
+            <a:schemeClr val="accent1"/>
+          </a:fillRef>
+          <a:effectRef idx="0">
+            <a:schemeClr val="accent1"/>
+          </a:effectRef>
+          <a:fontRef idx="minor">
+            <a:schemeClr val="tx1"/>
+          </a:fontRef>
+        </p:style>
+      </p:cxnSp>
+      <p:cxnSp>
+        <p:nvCxnSpPr>
+          <p:cNvPr id="126" name="Straight Connector 125"/>
+          <p:cNvCxnSpPr/>
+          <p:nvPr/>
+        </p:nvCxnSpPr>
+        <p:spPr>
+          <a:xfrm>
+            <a:off x="4480050" y="4149678"/>
+            <a:ext cx="979979" cy="254715"/>
+          </a:xfrm>
+          <a:prstGeom prst="line">
+            <a:avLst/>
+          </a:prstGeom>
+          <a:ln w="19050">
+            <a:solidFill>
+              <a:schemeClr val="tx1"/>
+            </a:solidFill>
+            <a:prstDash val="dash"/>
+          </a:ln>
+        </p:spPr>
+        <p:style>
+          <a:lnRef idx="1">
+            <a:schemeClr val="accent1"/>
+          </a:lnRef>
+          <a:fillRef idx="0">
+            <a:schemeClr val="accent1"/>
+          </a:fillRef>
+          <a:effectRef idx="0">
+            <a:schemeClr val="accent1"/>
+          </a:effectRef>
+          <a:fontRef idx="minor">
+            <a:schemeClr val="tx1"/>
+          </a:fontRef>
+        </p:style>
+      </p:cxnSp>
+      <p:cxnSp>
+        <p:nvCxnSpPr>
+          <p:cNvPr id="127" name="Straight Connector 126"/>
+          <p:cNvCxnSpPr/>
+          <p:nvPr/>
+        </p:nvCxnSpPr>
+        <p:spPr>
+          <a:xfrm>
+            <a:off x="6190789" y="3916861"/>
+            <a:ext cx="953079" cy="247723"/>
+          </a:xfrm>
+          <a:prstGeom prst="line">
+            <a:avLst/>
+          </a:prstGeom>
+          <a:ln w="19050">
+            <a:solidFill>
+              <a:schemeClr val="tx1"/>
+            </a:solidFill>
+            <a:prstDash val="dash"/>
+          </a:ln>
+        </p:spPr>
+        <p:style>
+          <a:lnRef idx="1">
+            <a:schemeClr val="accent1"/>
+          </a:lnRef>
+          <a:fillRef idx="0">
+            <a:schemeClr val="accent1"/>
+          </a:fillRef>
+          <a:effectRef idx="0">
+            <a:schemeClr val="accent1"/>
+          </a:effectRef>
+          <a:fontRef idx="minor">
+            <a:schemeClr val="tx1"/>
+          </a:fontRef>
+        </p:style>
+      </p:cxnSp>
+      <p:cxnSp>
+        <p:nvCxnSpPr>
+          <p:cNvPr id="128" name="Straight Connector 127"/>
+          <p:cNvCxnSpPr/>
+          <p:nvPr/>
+        </p:nvCxnSpPr>
+        <p:spPr>
+          <a:xfrm flipV="1">
+            <a:off x="4477890" y="4934712"/>
+            <a:ext cx="965734" cy="186436"/>
+          </a:xfrm>
+          <a:prstGeom prst="line">
+            <a:avLst/>
+          </a:prstGeom>
+          <a:ln w="19050">
+            <a:solidFill>
+              <a:schemeClr val="accent2">
+                <a:lumMod val="50000"/>
+              </a:schemeClr>
+            </a:solidFill>
+            <a:prstDash val="dash"/>
+          </a:ln>
+        </p:spPr>
+        <p:style>
+          <a:lnRef idx="1">
+            <a:schemeClr val="accent1"/>
+          </a:lnRef>
+          <a:fillRef idx="0">
+            <a:schemeClr val="accent1"/>
+          </a:fillRef>
+          <a:effectRef idx="0">
+            <a:schemeClr val="accent1"/>
+          </a:effectRef>
+          <a:fontRef idx="minor">
+            <a:schemeClr val="tx1"/>
+          </a:fontRef>
+        </p:style>
+      </p:cxnSp>
+      <p:cxnSp>
+        <p:nvCxnSpPr>
+          <p:cNvPr id="130" name="Straight Connector 129"/>
+          <p:cNvCxnSpPr/>
+          <p:nvPr/>
+        </p:nvCxnSpPr>
+        <p:spPr>
+          <a:xfrm>
+            <a:off x="6174540" y="4934712"/>
+            <a:ext cx="963730" cy="198628"/>
+          </a:xfrm>
+          <a:prstGeom prst="line">
+            <a:avLst/>
+          </a:prstGeom>
+          <a:ln w="19050">
+            <a:solidFill>
+              <a:schemeClr val="accent2">
+                <a:lumMod val="50000"/>
+              </a:schemeClr>
+            </a:solidFill>
+            <a:prstDash val="dash"/>
+          </a:ln>
+        </p:spPr>
+        <p:style>
+          <a:lnRef idx="1">
+            <a:schemeClr val="accent1"/>
+          </a:lnRef>
+          <a:fillRef idx="0">
+            <a:schemeClr val="accent1"/>
+          </a:fillRef>
+          <a:effectRef idx="0">
+            <a:schemeClr val="accent1"/>
+          </a:effectRef>
+          <a:fontRef idx="minor">
+            <a:schemeClr val="tx1"/>
+          </a:fontRef>
+        </p:style>
+      </p:cxnSp>
+      <p:cxnSp>
+        <p:nvCxnSpPr>
+          <p:cNvPr id="133" name="Straight Connector 132"/>
+          <p:cNvCxnSpPr/>
+          <p:nvPr/>
+        </p:nvCxnSpPr>
+        <p:spPr>
+          <a:xfrm flipV="1">
+            <a:off x="6174384" y="5132815"/>
+            <a:ext cx="980135" cy="436897"/>
+          </a:xfrm>
+          <a:prstGeom prst="line">
+            <a:avLst/>
+          </a:prstGeom>
+          <a:ln w="19050">
+            <a:solidFill>
+              <a:schemeClr val="accent2">
+                <a:lumMod val="50000"/>
+              </a:schemeClr>
+            </a:solidFill>
+            <a:prstDash val="dash"/>
+          </a:ln>
+        </p:spPr>
+        <p:style>
+          <a:lnRef idx="1">
+            <a:schemeClr val="accent1"/>
+          </a:lnRef>
+          <a:fillRef idx="0">
+            <a:schemeClr val="accent1"/>
+          </a:fillRef>
+          <a:effectRef idx="0">
+            <a:schemeClr val="accent1"/>
+          </a:effectRef>
+          <a:fontRef idx="minor">
+            <a:schemeClr val="tx1"/>
+          </a:fontRef>
+        </p:style>
+      </p:cxnSp>
+      <p:cxnSp>
+        <p:nvCxnSpPr>
+          <p:cNvPr id="137" name="Straight Connector 136"/>
+          <p:cNvCxnSpPr/>
+          <p:nvPr/>
+        </p:nvCxnSpPr>
+        <p:spPr>
+          <a:xfrm>
+            <a:off x="4477890" y="5121148"/>
+            <a:ext cx="965734" cy="448564"/>
+          </a:xfrm>
+          <a:prstGeom prst="line">
+            <a:avLst/>
+          </a:prstGeom>
+          <a:ln w="19050">
+            <a:solidFill>
+              <a:schemeClr val="accent2">
+                <a:lumMod val="50000"/>
+              </a:schemeClr>
+            </a:solidFill>
+            <a:prstDash val="dash"/>
+          </a:ln>
+        </p:spPr>
+        <p:style>
+          <a:lnRef idx="1">
+            <a:schemeClr val="accent1"/>
+          </a:lnRef>
+          <a:fillRef idx="0">
+            <a:schemeClr val="accent1"/>
+          </a:fillRef>
+          <a:effectRef idx="0">
+            <a:schemeClr val="accent1"/>
+          </a:effectRef>
+          <a:fontRef idx="minor">
+            <a:schemeClr val="tx1"/>
+          </a:fontRef>
+        </p:style>
+      </p:cxnSp>
+      <p:grpSp>
+        <p:nvGrpSpPr>
+          <p:cNvPr id="287" name="Group 286"/>
+          <p:cNvGrpSpPr/>
+          <p:nvPr/>
+        </p:nvGrpSpPr>
+        <p:grpSpPr>
+          <a:xfrm>
+            <a:off x="5469950" y="4602495"/>
+            <a:ext cx="306475" cy="306475"/>
+            <a:chOff x="5489804" y="3894559"/>
+            <a:chExt cx="306475" cy="306475"/>
+          </a:xfrm>
+        </p:grpSpPr>
+        <p:sp>
+          <p:nvSpPr>
+            <p:cNvPr id="281" name="Oval 280"/>
+            <p:cNvSpPr/>
+            <p:nvPr/>
+          </p:nvSpPr>
+          <p:spPr>
+            <a:xfrm>
+              <a:off x="5489804" y="3894559"/>
+              <a:ext cx="306475" cy="306475"/>
+            </a:xfrm>
+            <a:prstGeom prst="ellipse">
+              <a:avLst/>
+            </a:prstGeom>
+            <a:solidFill>
+              <a:schemeClr val="accent4">
+                <a:lumMod val="60000"/>
+                <a:lumOff val="40000"/>
+              </a:schemeClr>
+            </a:solidFill>
+            <a:ln>
+              <a:solidFill>
+                <a:schemeClr val="accent4">
+                  <a:lumMod val="75000"/>
+                </a:schemeClr>
+              </a:solidFill>
+            </a:ln>
+          </p:spPr>
+          <p:style>
+            <a:lnRef idx="2">
+              <a:schemeClr val="accent1">
+                <a:shade val="50000"/>
+              </a:schemeClr>
+            </a:lnRef>
+            <a:fillRef idx="1">
+              <a:schemeClr val="accent1"/>
+            </a:fillRef>
+            <a:effectRef idx="0">
+              <a:schemeClr val="accent1"/>
+            </a:effectRef>
+            <a:fontRef idx="minor">
+              <a:schemeClr val="lt1"/>
+            </a:fontRef>
+          </p:style>
+          <p:txBody>
+            <a:bodyPr rtlCol="0" anchor="ctr"/>
+            <a:lstStyle/>
+            <a:p>
+              <a:pPr algn="ctr"/>
+              <a:endParaRPr lang="en-GB"/>
+            </a:p>
+          </p:txBody>
+        </p:sp>
+        <p:cxnSp>
+          <p:nvCxnSpPr>
+            <p:cNvPr id="283" name="Straight Arrow Connector 282"/>
+            <p:cNvCxnSpPr/>
+            <p:nvPr/>
+          </p:nvCxnSpPr>
+          <p:spPr>
+            <a:xfrm>
+              <a:off x="5506210" y="4051809"/>
+              <a:ext cx="284480" cy="0"/>
+            </a:xfrm>
+            <a:prstGeom prst="straightConnector1">
+              <a:avLst/>
+            </a:prstGeom>
+            <a:ln w="25400">
+              <a:solidFill>
+                <a:schemeClr val="tx1"/>
+              </a:solidFill>
+              <a:tailEnd type="triangle"/>
+            </a:ln>
+          </p:spPr>
+          <p:style>
+            <a:lnRef idx="1">
+              <a:schemeClr val="accent1"/>
+            </a:lnRef>
+            <a:fillRef idx="0">
+              <a:schemeClr val="accent1"/>
+            </a:fillRef>
+            <a:effectRef idx="0">
+              <a:schemeClr val="accent1"/>
+            </a:effectRef>
+            <a:fontRef idx="minor">
+              <a:schemeClr val="tx1"/>
+            </a:fontRef>
+          </p:style>
+        </p:cxnSp>
+        <p:cxnSp>
+          <p:nvCxnSpPr>
+            <p:cNvPr id="286" name="Straight Connector 285"/>
+            <p:cNvCxnSpPr/>
+            <p:nvPr/>
+          </p:nvCxnSpPr>
+          <p:spPr>
+            <a:xfrm>
+              <a:off x="5572760" y="4006989"/>
+              <a:ext cx="0" cy="89639"/>
+            </a:xfrm>
+            <a:prstGeom prst="line">
+              <a:avLst/>
+            </a:prstGeom>
+            <a:ln w="25400">
+              <a:solidFill>
+                <a:schemeClr val="tx1"/>
+              </a:solidFill>
+            </a:ln>
+          </p:spPr>
+          <p:style>
+            <a:lnRef idx="1">
+              <a:schemeClr val="accent1"/>
+            </a:lnRef>
+            <a:fillRef idx="0">
+              <a:schemeClr val="accent1"/>
+            </a:fillRef>
+            <a:effectRef idx="0">
+              <a:schemeClr val="accent1"/>
+            </a:effectRef>
+            <a:fontRef idx="minor">
+              <a:schemeClr val="tx1"/>
+            </a:fontRef>
+          </p:style>
+        </p:cxnSp>
+      </p:grpSp>
+      <p:grpSp>
+        <p:nvGrpSpPr>
+          <p:cNvPr id="157" name="Group 156"/>
+          <p:cNvGrpSpPr/>
+          <p:nvPr/>
+        </p:nvGrpSpPr>
+        <p:grpSpPr>
+          <a:xfrm rot="10800000">
+            <a:off x="5867909" y="4602494"/>
+            <a:ext cx="306475" cy="306475"/>
+            <a:chOff x="5489804" y="3894559"/>
+            <a:chExt cx="306475" cy="306475"/>
+          </a:xfrm>
+        </p:grpSpPr>
+        <p:sp>
+          <p:nvSpPr>
+            <p:cNvPr id="158" name="Oval 157"/>
+            <p:cNvSpPr/>
+            <p:nvPr/>
+          </p:nvSpPr>
+          <p:spPr>
+            <a:xfrm>
+              <a:off x="5489804" y="3894559"/>
+              <a:ext cx="306475" cy="306475"/>
+            </a:xfrm>
+            <a:prstGeom prst="ellipse">
+              <a:avLst/>
+            </a:prstGeom>
+            <a:solidFill>
+              <a:schemeClr val="accent4">
+                <a:lumMod val="60000"/>
+                <a:lumOff val="40000"/>
+              </a:schemeClr>
+            </a:solidFill>
+            <a:ln>
+              <a:solidFill>
+                <a:schemeClr val="accent4">
+                  <a:lumMod val="75000"/>
+                </a:schemeClr>
+              </a:solidFill>
+            </a:ln>
+          </p:spPr>
+          <p:style>
+            <a:lnRef idx="2">
+              <a:schemeClr val="accent1">
+                <a:shade val="50000"/>
+              </a:schemeClr>
+            </a:lnRef>
+            <a:fillRef idx="1">
+              <a:schemeClr val="accent1"/>
+            </a:fillRef>
+            <a:effectRef idx="0">
+              <a:schemeClr val="accent1"/>
+            </a:effectRef>
+            <a:fontRef idx="minor">
+              <a:schemeClr val="lt1"/>
+            </a:fontRef>
+          </p:style>
+          <p:txBody>
+            <a:bodyPr rtlCol="0" anchor="ctr"/>
+            <a:lstStyle/>
+            <a:p>
+              <a:pPr algn="ctr"/>
+              <a:endParaRPr lang="en-GB"/>
+            </a:p>
+          </p:txBody>
+        </p:sp>
+        <p:cxnSp>
+          <p:nvCxnSpPr>
+            <p:cNvPr id="159" name="Straight Arrow Connector 158"/>
+            <p:cNvCxnSpPr/>
+            <p:nvPr/>
+          </p:nvCxnSpPr>
+          <p:spPr>
+            <a:xfrm>
+              <a:off x="5506210" y="4051809"/>
+              <a:ext cx="284480" cy="0"/>
+            </a:xfrm>
+            <a:prstGeom prst="straightConnector1">
+              <a:avLst/>
+            </a:prstGeom>
+            <a:ln w="25400">
+              <a:solidFill>
+                <a:schemeClr val="tx1"/>
+              </a:solidFill>
+              <a:tailEnd type="triangle"/>
+            </a:ln>
+          </p:spPr>
+          <p:style>
+            <a:lnRef idx="1">
+              <a:schemeClr val="accent1"/>
+            </a:lnRef>
+            <a:fillRef idx="0">
+              <a:schemeClr val="accent1"/>
+            </a:fillRef>
+            <a:effectRef idx="0">
+              <a:schemeClr val="accent1"/>
+            </a:effectRef>
+            <a:fontRef idx="minor">
+              <a:schemeClr val="tx1"/>
+            </a:fontRef>
+          </p:style>
+        </p:cxnSp>
+        <p:cxnSp>
+          <p:nvCxnSpPr>
+            <p:cNvPr id="160" name="Straight Connector 159"/>
+            <p:cNvCxnSpPr/>
+            <p:nvPr/>
+          </p:nvCxnSpPr>
+          <p:spPr>
+            <a:xfrm>
+              <a:off x="5572760" y="4006989"/>
+              <a:ext cx="0" cy="89639"/>
+            </a:xfrm>
+            <a:prstGeom prst="line">
+              <a:avLst/>
+            </a:prstGeom>
+            <a:ln w="25400">
+              <a:solidFill>
+                <a:schemeClr val="tx1"/>
+              </a:solidFill>
+            </a:ln>
+          </p:spPr>
+          <p:style>
+            <a:lnRef idx="1">
+              <a:schemeClr val="accent1"/>
+            </a:lnRef>
+            <a:fillRef idx="0">
+              <a:schemeClr val="accent1"/>
+            </a:fillRef>
+            <a:effectRef idx="0">
+              <a:schemeClr val="accent1"/>
+            </a:effectRef>
+            <a:fontRef idx="minor">
+              <a:schemeClr val="tx1"/>
+            </a:fontRef>
+          </p:style>
+        </p:cxnSp>
+      </p:grpSp>
+      <p:grpSp>
+        <p:nvGrpSpPr>
+          <p:cNvPr id="161" name="Group 160"/>
+          <p:cNvGrpSpPr/>
+          <p:nvPr/>
+        </p:nvGrpSpPr>
+        <p:grpSpPr>
+          <a:xfrm>
+            <a:off x="5477466" y="5237493"/>
+            <a:ext cx="306475" cy="306475"/>
+            <a:chOff x="5489804" y="3894559"/>
+            <a:chExt cx="306475" cy="306475"/>
+          </a:xfrm>
+        </p:grpSpPr>
+        <p:sp>
+          <p:nvSpPr>
+            <p:cNvPr id="165" name="Oval 164"/>
+            <p:cNvSpPr/>
+            <p:nvPr/>
+          </p:nvSpPr>
+          <p:spPr>
+            <a:xfrm>
+              <a:off x="5489804" y="3894559"/>
+              <a:ext cx="306475" cy="306475"/>
+            </a:xfrm>
+            <a:prstGeom prst="ellipse">
+              <a:avLst/>
+            </a:prstGeom>
+            <a:solidFill>
+              <a:schemeClr val="accent4">
+                <a:lumMod val="60000"/>
+                <a:lumOff val="40000"/>
+              </a:schemeClr>
+            </a:solidFill>
+            <a:ln>
+              <a:solidFill>
+                <a:schemeClr val="accent4">
+                  <a:lumMod val="75000"/>
+                </a:schemeClr>
+              </a:solidFill>
+            </a:ln>
+          </p:spPr>
+          <p:style>
+            <a:lnRef idx="2">
+              <a:schemeClr val="accent1">
+                <a:shade val="50000"/>
+              </a:schemeClr>
+            </a:lnRef>
+            <a:fillRef idx="1">
+              <a:schemeClr val="accent1"/>
+            </a:fillRef>
+            <a:effectRef idx="0">
+              <a:schemeClr val="accent1"/>
+            </a:effectRef>
+            <a:fontRef idx="minor">
+              <a:schemeClr val="lt1"/>
+            </a:fontRef>
+          </p:style>
+          <p:txBody>
+            <a:bodyPr rtlCol="0" anchor="ctr"/>
+            <a:lstStyle/>
+            <a:p>
+              <a:pPr algn="ctr"/>
+              <a:endParaRPr lang="en-GB"/>
+            </a:p>
+          </p:txBody>
+        </p:sp>
+        <p:cxnSp>
+          <p:nvCxnSpPr>
+            <p:cNvPr id="166" name="Straight Arrow Connector 165"/>
+            <p:cNvCxnSpPr/>
+            <p:nvPr/>
+          </p:nvCxnSpPr>
+          <p:spPr>
+            <a:xfrm>
+              <a:off x="5506210" y="4051809"/>
+              <a:ext cx="284480" cy="0"/>
+            </a:xfrm>
+            <a:prstGeom prst="straightConnector1">
+              <a:avLst/>
+            </a:prstGeom>
+            <a:ln w="25400">
+              <a:solidFill>
+                <a:schemeClr val="tx1"/>
+              </a:solidFill>
+              <a:tailEnd type="triangle"/>
+            </a:ln>
+          </p:spPr>
+          <p:style>
+            <a:lnRef idx="1">
+              <a:schemeClr val="accent1"/>
+            </a:lnRef>
+            <a:fillRef idx="0">
+              <a:schemeClr val="accent1"/>
+            </a:fillRef>
+            <a:effectRef idx="0">
+              <a:schemeClr val="accent1"/>
+            </a:effectRef>
+            <a:fontRef idx="minor">
+              <a:schemeClr val="tx1"/>
+            </a:fontRef>
+          </p:style>
+        </p:cxnSp>
+        <p:cxnSp>
+          <p:nvCxnSpPr>
+            <p:cNvPr id="167" name="Straight Connector 166"/>
+            <p:cNvCxnSpPr/>
+            <p:nvPr/>
+          </p:nvCxnSpPr>
+          <p:spPr>
+            <a:xfrm>
+              <a:off x="5572760" y="4006989"/>
+              <a:ext cx="0" cy="89639"/>
+            </a:xfrm>
+            <a:prstGeom prst="line">
+              <a:avLst/>
+            </a:prstGeom>
+            <a:ln w="25400">
+              <a:solidFill>
+                <a:schemeClr val="tx1"/>
+              </a:solidFill>
+            </a:ln>
+          </p:spPr>
+          <p:style>
+            <a:lnRef idx="1">
+              <a:schemeClr val="accent1"/>
+            </a:lnRef>
+            <a:fillRef idx="0">
+              <a:schemeClr val="accent1"/>
+            </a:fillRef>
+            <a:effectRef idx="0">
+              <a:schemeClr val="accent1"/>
+            </a:effectRef>
+            <a:fontRef idx="minor">
+              <a:schemeClr val="tx1"/>
+            </a:fontRef>
+          </p:style>
+        </p:cxnSp>
+      </p:grpSp>
+      <p:grpSp>
+        <p:nvGrpSpPr>
+          <p:cNvPr id="168" name="Group 167"/>
+          <p:cNvGrpSpPr/>
+          <p:nvPr/>
+        </p:nvGrpSpPr>
+        <p:grpSpPr>
+          <a:xfrm>
+            <a:off x="5875425" y="5237492"/>
+            <a:ext cx="306475" cy="306475"/>
+            <a:chOff x="5489804" y="3894559"/>
+            <a:chExt cx="306475" cy="306475"/>
+          </a:xfrm>
+        </p:grpSpPr>
+        <p:sp>
+          <p:nvSpPr>
+            <p:cNvPr id="169" name="Oval 168"/>
+            <p:cNvSpPr/>
+            <p:nvPr/>
+          </p:nvSpPr>
+          <p:spPr>
+            <a:xfrm>
+              <a:off x="5489804" y="3894559"/>
+              <a:ext cx="306475" cy="306475"/>
+            </a:xfrm>
+            <a:prstGeom prst="ellipse">
+              <a:avLst/>
+            </a:prstGeom>
+            <a:solidFill>
+              <a:schemeClr val="accent4">
+                <a:lumMod val="60000"/>
+                <a:lumOff val="40000"/>
+              </a:schemeClr>
+            </a:solidFill>
+            <a:ln>
+              <a:solidFill>
+                <a:schemeClr val="accent4">
+                  <a:lumMod val="75000"/>
+                </a:schemeClr>
+              </a:solidFill>
+            </a:ln>
+          </p:spPr>
+          <p:style>
+            <a:lnRef idx="2">
+              <a:schemeClr val="accent1">
+                <a:shade val="50000"/>
+              </a:schemeClr>
+            </a:lnRef>
+            <a:fillRef idx="1">
+              <a:schemeClr val="accent1"/>
+            </a:fillRef>
+            <a:effectRef idx="0">
+              <a:schemeClr val="accent1"/>
+            </a:effectRef>
+            <a:fontRef idx="minor">
+              <a:schemeClr val="lt1"/>
+            </a:fontRef>
+          </p:style>
+          <p:txBody>
+            <a:bodyPr rtlCol="0" anchor="ctr"/>
+            <a:lstStyle/>
+            <a:p>
+              <a:pPr algn="ctr"/>
+              <a:endParaRPr lang="en-GB"/>
+            </a:p>
+          </p:txBody>
+        </p:sp>
+        <p:cxnSp>
+          <p:nvCxnSpPr>
+            <p:cNvPr id="170" name="Straight Arrow Connector 169"/>
+            <p:cNvCxnSpPr/>
+            <p:nvPr/>
+          </p:nvCxnSpPr>
+          <p:spPr>
+            <a:xfrm>
+              <a:off x="5506210" y="4051809"/>
+              <a:ext cx="284480" cy="0"/>
+            </a:xfrm>
+            <a:prstGeom prst="straightConnector1">
+              <a:avLst/>
+            </a:prstGeom>
+            <a:ln w="25400">
+              <a:solidFill>
+                <a:schemeClr val="tx1"/>
+              </a:solidFill>
+              <a:tailEnd type="triangle"/>
+            </a:ln>
+          </p:spPr>
+          <p:style>
+            <a:lnRef idx="1">
+              <a:schemeClr val="accent1"/>
+            </a:lnRef>
+            <a:fillRef idx="0">
+              <a:schemeClr val="accent1"/>
+            </a:fillRef>
+            <a:effectRef idx="0">
+              <a:schemeClr val="accent1"/>
+            </a:effectRef>
+            <a:fontRef idx="minor">
+              <a:schemeClr val="tx1"/>
+            </a:fontRef>
+          </p:style>
+        </p:cxnSp>
+        <p:cxnSp>
+          <p:nvCxnSpPr>
+            <p:cNvPr id="171" name="Straight Connector 170"/>
+            <p:cNvCxnSpPr/>
+            <p:nvPr/>
+          </p:nvCxnSpPr>
+          <p:spPr>
+            <a:xfrm>
+              <a:off x="5572760" y="4006989"/>
+              <a:ext cx="0" cy="89639"/>
+            </a:xfrm>
+            <a:prstGeom prst="line">
+              <a:avLst/>
+            </a:prstGeom>
+            <a:ln w="25400">
+              <a:solidFill>
+                <a:schemeClr val="tx1"/>
+              </a:solidFill>
+            </a:ln>
+          </p:spPr>
+          <p:style>
+            <a:lnRef idx="1">
+              <a:schemeClr val="accent1"/>
+            </a:lnRef>
+            <a:fillRef idx="0">
+              <a:schemeClr val="accent1"/>
+            </a:fillRef>
+            <a:effectRef idx="0">
+              <a:schemeClr val="accent1"/>
+            </a:effectRef>
+            <a:fontRef idx="minor">
+              <a:schemeClr val="tx1"/>
+            </a:fontRef>
+          </p:style>
+        </p:cxnSp>
+      </p:grpSp>
+      <p:sp>
+        <p:nvSpPr>
+          <p:cNvPr id="32" name="TextBox 31"/>
+          <p:cNvSpPr txBox="1"/>
+          <p:nvPr/>
+        </p:nvSpPr>
+        <p:spPr>
+          <a:xfrm>
+            <a:off x="6066329" y="4491333"/>
+            <a:ext cx="248920" cy="369332"/>
+          </a:xfrm>
+          <a:prstGeom prst="rect">
+            <a:avLst/>
+          </a:prstGeom>
+          <a:noFill/>
+        </p:spPr>
+        <p:txBody>
+          <a:bodyPr wrap="square" rtlCol="0">
+            <a:spAutoFit/>
+          </a:bodyPr>
+          <a:lstStyle/>
+          <a:p>
+            <a:r>
+              <a:rPr lang="en-GB" dirty="0" smtClean="0"/>
+              <a:t>*</a:t>
+            </a:r>
+            <a:endParaRPr lang="en-GB" dirty="0"/>
+          </a:p>
+        </p:txBody>
+      </p:sp>
+      <p:sp>
+        <p:nvSpPr>
+          <p:cNvPr id="33" name="TextBox 32"/>
+          <p:cNvSpPr txBox="1"/>
+          <p:nvPr/>
+        </p:nvSpPr>
+        <p:spPr>
+          <a:xfrm>
+            <a:off x="3912840" y="3886833"/>
+            <a:ext cx="487634" cy="307777"/>
+          </a:xfrm>
+          <a:prstGeom prst="rect">
+            <a:avLst/>
+          </a:prstGeom>
+          <a:noFill/>
+        </p:spPr>
+        <p:txBody>
+          <a:bodyPr wrap="none" rtlCol="0">
+            <a:spAutoFit/>
+          </a:bodyPr>
+          <a:lstStyle/>
+          <a:p>
+            <a:r>
+              <a:rPr lang="en-GB" sz="1400" dirty="0" smtClean="0"/>
+              <a:t>l = 2</a:t>
+            </a:r>
+            <a:endParaRPr lang="en-GB" sz="1400" dirty="0"/>
+          </a:p>
+        </p:txBody>
+      </p:sp>
+      <p:sp>
+        <p:nvSpPr>
+          <p:cNvPr id="173" name="TextBox 172"/>
+          <p:cNvSpPr txBox="1"/>
+          <p:nvPr/>
+        </p:nvSpPr>
+        <p:spPr>
+          <a:xfrm>
+            <a:off x="7225970" y="4874041"/>
+            <a:ext cx="487634" cy="307777"/>
+          </a:xfrm>
+          <a:prstGeom prst="rect">
+            <a:avLst/>
+          </a:prstGeom>
+          <a:noFill/>
+        </p:spPr>
+        <p:txBody>
+          <a:bodyPr wrap="none" rtlCol="0">
+            <a:spAutoFit/>
+          </a:bodyPr>
+          <a:lstStyle/>
+          <a:p>
+            <a:r>
+              <a:rPr lang="en-GB" sz="1400" dirty="0" smtClean="0"/>
+              <a:t>l = 1</a:t>
+            </a:r>
+            <a:endParaRPr lang="en-GB" sz="1400" dirty="0"/>
+          </a:p>
+        </p:txBody>
+      </p:sp>
+      <p:sp>
+        <p:nvSpPr>
+          <p:cNvPr id="174" name="TextBox 173"/>
+          <p:cNvSpPr txBox="1"/>
+          <p:nvPr/>
+        </p:nvSpPr>
+        <p:spPr>
+          <a:xfrm>
+            <a:off x="3911760" y="4860665"/>
+            <a:ext cx="487634" cy="307777"/>
+          </a:xfrm>
+          <a:prstGeom prst="rect">
+            <a:avLst/>
+          </a:prstGeom>
+          <a:noFill/>
+        </p:spPr>
+        <p:txBody>
+          <a:bodyPr wrap="none" rtlCol="0">
+            <a:spAutoFit/>
+          </a:bodyPr>
+          <a:lstStyle/>
+          <a:p>
+            <a:r>
+              <a:rPr lang="en-GB" sz="1400" dirty="0" smtClean="0"/>
+              <a:t>l = 1</a:t>
+            </a:r>
+            <a:endParaRPr lang="en-GB" sz="1400" dirty="0"/>
+          </a:p>
+        </p:txBody>
+      </p:sp>
+      <p:cxnSp>
+        <p:nvCxnSpPr>
+          <p:cNvPr id="35" name="Straight Connector 34"/>
+          <p:cNvCxnSpPr/>
+          <p:nvPr/>
+        </p:nvCxnSpPr>
+        <p:spPr>
+          <a:xfrm flipV="1">
+            <a:off x="4477890" y="3585464"/>
+            <a:ext cx="2660380" cy="1535684"/>
+          </a:xfrm>
+          <a:prstGeom prst="line">
+            <a:avLst/>
+          </a:prstGeom>
+          <a:ln w="19050">
+            <a:solidFill>
+              <a:schemeClr val="accent1">
+                <a:lumMod val="75000"/>
+              </a:schemeClr>
+            </a:solidFill>
+            <a:prstDash val="dash"/>
+          </a:ln>
+        </p:spPr>
+        <p:style>
+          <a:lnRef idx="1">
+            <a:schemeClr val="accent1"/>
+          </a:lnRef>
+          <a:fillRef idx="0">
+            <a:schemeClr val="accent1"/>
+          </a:fillRef>
+          <a:effectRef idx="0">
+            <a:schemeClr val="accent1"/>
+          </a:effectRef>
+          <a:fontRef idx="minor">
+            <a:schemeClr val="tx1"/>
+          </a:fontRef>
+        </p:style>
+      </p:cxnSp>
+      <p:cxnSp>
+        <p:nvCxnSpPr>
+          <p:cNvPr id="37" name="Straight Connector 36"/>
+          <p:cNvCxnSpPr/>
+          <p:nvPr/>
+        </p:nvCxnSpPr>
+        <p:spPr>
+          <a:xfrm flipV="1">
+            <a:off x="4477890" y="3737864"/>
+            <a:ext cx="2660380" cy="1383284"/>
+          </a:xfrm>
+          <a:prstGeom prst="line">
+            <a:avLst/>
+          </a:prstGeom>
+          <a:ln w="19050">
+            <a:solidFill>
+              <a:schemeClr val="accent1">
+                <a:lumMod val="75000"/>
+              </a:schemeClr>
+            </a:solidFill>
+            <a:prstDash val="dash"/>
+          </a:ln>
+        </p:spPr>
+        <p:style>
+          <a:lnRef idx="1">
+            <a:schemeClr val="accent1"/>
+          </a:lnRef>
+          <a:fillRef idx="0">
+            <a:schemeClr val="accent1"/>
+          </a:fillRef>
+          <a:effectRef idx="0">
+            <a:schemeClr val="accent1"/>
+          </a:effectRef>
+          <a:fontRef idx="minor">
+            <a:schemeClr val="tx1"/>
+          </a:fontRef>
+        </p:style>
+      </p:cxnSp>
+      <p:cxnSp>
+        <p:nvCxnSpPr>
+          <p:cNvPr id="39" name="Straight Connector 38"/>
+          <p:cNvCxnSpPr/>
+          <p:nvPr/>
+        </p:nvCxnSpPr>
+        <p:spPr>
+          <a:xfrm flipV="1">
+            <a:off x="4470845" y="4162045"/>
+            <a:ext cx="2678663" cy="970769"/>
+          </a:xfrm>
+          <a:prstGeom prst="line">
+            <a:avLst/>
+          </a:prstGeom>
+          <a:ln w="19050">
+            <a:solidFill>
+              <a:schemeClr val="accent1">
+                <a:lumMod val="75000"/>
+              </a:schemeClr>
+            </a:solidFill>
+            <a:prstDash val="dash"/>
+          </a:ln>
+        </p:spPr>
+        <p:style>
+          <a:lnRef idx="1">
+            <a:schemeClr val="accent1"/>
+          </a:lnRef>
+          <a:fillRef idx="0">
+            <a:schemeClr val="accent1"/>
+          </a:fillRef>
+          <a:effectRef idx="0">
+            <a:schemeClr val="accent1"/>
+          </a:effectRef>
+          <a:fontRef idx="minor">
+            <a:schemeClr val="tx1"/>
+          </a:fontRef>
+        </p:style>
+      </p:cxnSp>
+      <p:cxnSp>
+        <p:nvCxnSpPr>
+          <p:cNvPr id="111" name="Straight Connector 110"/>
+          <p:cNvCxnSpPr/>
+          <p:nvPr/>
+        </p:nvCxnSpPr>
+        <p:spPr>
+          <a:xfrm>
+            <a:off x="3833264" y="5121148"/>
+            <a:ext cx="646786" cy="0"/>
+          </a:xfrm>
+          <a:prstGeom prst="line">
+            <a:avLst/>
+          </a:prstGeom>
+          <a:ln w="31750">
+            <a:solidFill>
+              <a:schemeClr val="tx1"/>
+            </a:solidFill>
+          </a:ln>
+        </p:spPr>
+        <p:style>
+          <a:lnRef idx="1">
+            <a:schemeClr val="accent1"/>
+          </a:lnRef>
+          <a:fillRef idx="0">
+            <a:schemeClr val="accent1"/>
+          </a:fillRef>
+          <a:effectRef idx="0">
+            <a:schemeClr val="accent1"/>
+          </a:effectRef>
+          <a:fontRef idx="minor">
+            <a:schemeClr val="tx1"/>
+          </a:fontRef>
+        </p:style>
+      </p:cxnSp>
+      <p:cxnSp>
+        <p:nvCxnSpPr>
+          <p:cNvPr id="112" name="Straight Connector 111"/>
+          <p:cNvCxnSpPr/>
+          <p:nvPr/>
+        </p:nvCxnSpPr>
+        <p:spPr>
+          <a:xfrm>
+            <a:off x="7138270" y="3585464"/>
+            <a:ext cx="646786" cy="0"/>
+          </a:xfrm>
+          <a:prstGeom prst="line">
+            <a:avLst/>
+          </a:prstGeom>
+          <a:ln w="31750">
+            <a:solidFill>
+              <a:schemeClr val="tx1"/>
+            </a:solidFill>
+          </a:ln>
+        </p:spPr>
+        <p:style>
+          <a:lnRef idx="1">
+            <a:schemeClr val="accent1"/>
+          </a:lnRef>
+          <a:fillRef idx="0">
+            <a:schemeClr val="accent1"/>
+          </a:fillRef>
+          <a:effectRef idx="0">
+            <a:schemeClr val="accent1"/>
+          </a:effectRef>
+          <a:fontRef idx="minor">
+            <a:schemeClr val="tx1"/>
+          </a:fontRef>
+        </p:style>
+      </p:cxnSp>
+      <p:cxnSp>
+        <p:nvCxnSpPr>
+          <p:cNvPr id="113" name="Straight Connector 112"/>
+          <p:cNvCxnSpPr/>
+          <p:nvPr/>
+        </p:nvCxnSpPr>
+        <p:spPr>
+          <a:xfrm>
+            <a:off x="7138270" y="3737864"/>
+            <a:ext cx="646786" cy="0"/>
+          </a:xfrm>
+          <a:prstGeom prst="line">
+            <a:avLst/>
+          </a:prstGeom>
+          <a:ln w="31750">
+            <a:solidFill>
+              <a:schemeClr val="tx1"/>
+            </a:solidFill>
+          </a:ln>
+        </p:spPr>
+        <p:style>
+          <a:lnRef idx="1">
+            <a:schemeClr val="accent1"/>
+          </a:lnRef>
+          <a:fillRef idx="0">
+            <a:schemeClr val="accent1"/>
+          </a:fillRef>
+          <a:effectRef idx="0">
+            <a:schemeClr val="accent1"/>
+          </a:effectRef>
+          <a:fontRef idx="minor">
+            <a:schemeClr val="tx1"/>
+          </a:fontRef>
+        </p:style>
+      </p:cxnSp>
+      <p:cxnSp>
+        <p:nvCxnSpPr>
+          <p:cNvPr id="114" name="Straight Connector 113"/>
+          <p:cNvCxnSpPr/>
+          <p:nvPr/>
+        </p:nvCxnSpPr>
+        <p:spPr>
+          <a:xfrm>
+            <a:off x="7138270" y="4164584"/>
+            <a:ext cx="646786" cy="0"/>
+          </a:xfrm>
+          <a:prstGeom prst="line">
+            <a:avLst/>
+          </a:prstGeom>
+          <a:ln w="31750">
+            <a:solidFill>
+              <a:schemeClr val="tx1"/>
+            </a:solidFill>
+          </a:ln>
+        </p:spPr>
+        <p:style>
+          <a:lnRef idx="1">
+            <a:schemeClr val="accent1"/>
+          </a:lnRef>
+          <a:fillRef idx="0">
+            <a:schemeClr val="accent1"/>
+          </a:fillRef>
+          <a:effectRef idx="0">
+            <a:schemeClr val="accent1"/>
+          </a:effectRef>
+          <a:fontRef idx="minor">
+            <a:schemeClr val="tx1"/>
+          </a:fontRef>
+        </p:style>
+      </p:cxnSp>
+      <p:cxnSp>
+        <p:nvCxnSpPr>
+          <p:cNvPr id="124" name="Straight Connector 123"/>
+          <p:cNvCxnSpPr/>
+          <p:nvPr/>
+        </p:nvCxnSpPr>
+        <p:spPr>
+          <a:xfrm>
+            <a:off x="7121865" y="4165633"/>
+            <a:ext cx="646786" cy="0"/>
+          </a:xfrm>
+          <a:prstGeom prst="line">
+            <a:avLst/>
+          </a:prstGeom>
+          <a:ln w="31750">
+            <a:solidFill>
+              <a:schemeClr val="tx1"/>
+            </a:solidFill>
+          </a:ln>
+          <a:scene3d>
+            <a:camera prst="orthographicFront">
+              <a:rot lat="0" lon="0" rev="10800000"/>
+            </a:camera>
+            <a:lightRig rig="threePt" dir="t"/>
+          </a:scene3d>
+        </p:spPr>
+        <p:style>
+          <a:lnRef idx="1">
+            <a:schemeClr val="accent1"/>
+          </a:lnRef>
+          <a:fillRef idx="0">
+            <a:schemeClr val="accent1"/>
+          </a:fillRef>
+          <a:effectRef idx="0">
+            <a:schemeClr val="accent1"/>
+          </a:effectRef>
+          <a:fontRef idx="minor">
+            <a:schemeClr val="tx1"/>
+          </a:fontRef>
+        </p:style>
+      </p:cxnSp>
+      <p:sp>
+        <p:nvSpPr>
+          <p:cNvPr id="172" name="TextBox 171"/>
+          <p:cNvSpPr txBox="1"/>
+          <p:nvPr/>
+        </p:nvSpPr>
+        <p:spPr>
+          <a:xfrm>
+            <a:off x="7223465" y="3913632"/>
+            <a:ext cx="487634" cy="307777"/>
+          </a:xfrm>
+          <a:prstGeom prst="rect">
+            <a:avLst/>
+          </a:prstGeom>
+          <a:noFill/>
+        </p:spPr>
+        <p:txBody>
+          <a:bodyPr wrap="none" rtlCol="0">
+            <a:spAutoFit/>
+          </a:bodyPr>
+          <a:lstStyle/>
+          <a:p>
+            <a:r>
+              <a:rPr lang="en-GB" sz="1400" dirty="0" smtClean="0"/>
+              <a:t>l = 2</a:t>
+            </a:r>
+            <a:endParaRPr lang="en-GB" sz="1400" dirty="0"/>
+          </a:p>
+        </p:txBody>
+      </p:sp>
+      <p:sp>
+        <p:nvSpPr>
+          <p:cNvPr id="40" name="TextBox 39"/>
+          <p:cNvSpPr txBox="1"/>
+          <p:nvPr/>
+        </p:nvSpPr>
+        <p:spPr>
+          <a:xfrm>
+            <a:off x="5535088" y="2696525"/>
+            <a:ext cx="306494" cy="369332"/>
+          </a:xfrm>
+          <a:prstGeom prst="rect">
+            <a:avLst/>
+          </a:prstGeom>
+          <a:noFill/>
+        </p:spPr>
+        <p:txBody>
+          <a:bodyPr wrap="none" rtlCol="0">
+            <a:spAutoFit/>
+          </a:bodyPr>
+          <a:lstStyle/>
+          <a:p>
+            <a:r>
+              <a:rPr lang="en-GB" b="1" dirty="0" smtClean="0"/>
+              <a:t>d</a:t>
+            </a:r>
+            <a:endParaRPr lang="en-GB" b="1" dirty="0"/>
+          </a:p>
+        </p:txBody>
+      </p:sp>
+      <p:sp>
+        <p:nvSpPr>
+          <p:cNvPr id="41" name="TextBox 40"/>
+          <p:cNvSpPr txBox="1"/>
+          <p:nvPr/>
+        </p:nvSpPr>
+        <p:spPr>
+          <a:xfrm>
+            <a:off x="5560422" y="1906450"/>
+            <a:ext cx="328936" cy="369332"/>
+          </a:xfrm>
+          <a:prstGeom prst="rect">
+            <a:avLst/>
+          </a:prstGeom>
+          <a:noFill/>
+        </p:spPr>
+        <p:txBody>
+          <a:bodyPr wrap="none" rtlCol="0">
+            <a:spAutoFit/>
+          </a:bodyPr>
+          <a:lstStyle/>
+          <a:p>
+            <a:r>
+              <a:rPr lang="en-GB" b="1" dirty="0" smtClean="0"/>
+              <a:t>x</a:t>
+            </a:r>
+            <a:r>
+              <a:rPr lang="en-GB" b="1" baseline="-25000" dirty="0" smtClean="0"/>
+              <a:t>i</a:t>
+            </a:r>
+            <a:endParaRPr lang="en-GB" b="1" baseline="-25000" dirty="0"/>
+          </a:p>
+        </p:txBody>
+      </p:sp>
     </p:spTree>
     <p:extLst>
       <p:ext uri="{BB962C8B-B14F-4D97-AF65-F5344CB8AC3E}">
-        <p14:creationId xmlns:p14="http://schemas.microsoft.com/office/powerpoint/2010/main" val="2733752413"/>
+        <p14:creationId xmlns:p14="http://schemas.microsoft.com/office/powerpoint/2010/main" val="2620421137"/>
       </p:ext>
     </p:extLst>
   </p:cSld>

</xml_diff>